<commit_message>
Added sort algorithms implementation
</commit_message>
<xml_diff>
--- a/docs/Algorithms basics.pptx
+++ b/docs/Algorithms basics.pptx
@@ -5,10 +5,10 @@
     <p:sldMasterId id="2147483648" r:id="rId1"/>
   </p:sldMasterIdLst>
   <p:notesMasterIdLst>
-    <p:notesMasterId r:id="rId14"/>
+    <p:notesMasterId r:id="rId16"/>
   </p:notesMasterIdLst>
   <p:handoutMasterIdLst>
-    <p:handoutMasterId r:id="rId15"/>
+    <p:handoutMasterId r:id="rId17"/>
   </p:handoutMasterIdLst>
   <p:sldIdLst>
     <p:sldId id="261" r:id="rId2"/>
@@ -23,6 +23,8 @@
     <p:sldId id="278" r:id="rId11"/>
     <p:sldId id="279" r:id="rId12"/>
     <p:sldId id="280" r:id="rId13"/>
+    <p:sldId id="281" r:id="rId14"/>
+    <p:sldId id="282" r:id="rId15"/>
   </p:sldIdLst>
   <p:sldSz cx="12192000" cy="6858000"/>
   <p:notesSz cx="6858000" cy="9144000"/>
@@ -15939,6 +15941,607 @@
     <p:extLst>
       <p:ext uri="{BB962C8B-B14F-4D97-AF65-F5344CB8AC3E}">
         <p14:creationId xmlns:p14="http://schemas.microsoft.com/office/powerpoint/2010/main" val="2192219215"/>
+      </p:ext>
+    </p:extLst>
+  </p:cSld>
+  <p:clrMapOvr>
+    <a:masterClrMapping/>
+  </p:clrMapOvr>
+  <mc:AlternateContent xmlns:mc="http://schemas.openxmlformats.org/markup-compatibility/2006" xmlns:p14="http://schemas.microsoft.com/office/powerpoint/2010/main">
+    <mc:Choice Requires="p14">
+      <p:transition spd="med" p14:dur="700">
+        <p:fade/>
+      </p:transition>
+    </mc:Choice>
+    <mc:Fallback xmlns="">
+      <p:transition spd="med">
+        <p:fade/>
+      </p:transition>
+    </mc:Fallback>
+  </mc:AlternateContent>
+</p:sld>
+</file>
+
+<file path=ppt/slides/slide13.xml><?xml version="1.0" encoding="utf-8"?>
+<p:sld xmlns:a="http://schemas.openxmlformats.org/drawingml/2006/main" xmlns:r="http://schemas.openxmlformats.org/officeDocument/2006/relationships" xmlns:p="http://schemas.openxmlformats.org/presentationml/2006/main">
+  <p:cSld>
+    <p:spTree>
+      <p:nvGrpSpPr>
+        <p:cNvPr id="1" name="">
+          <a:extLst>
+            <a:ext uri="{FF2B5EF4-FFF2-40B4-BE49-F238E27FC236}">
+              <a16:creationId xmlns:a16="http://schemas.microsoft.com/office/drawing/2014/main" id="{1DE2B4DE-798C-30DA-DB12-78B82909CA6E}"/>
+            </a:ext>
+          </a:extLst>
+        </p:cNvPr>
+        <p:cNvGrpSpPr/>
+        <p:nvPr/>
+      </p:nvGrpSpPr>
+      <p:grpSpPr>
+        <a:xfrm>
+          <a:off x="0" y="0"/>
+          <a:ext cx="0" cy="0"/>
+          <a:chOff x="0" y="0"/>
+          <a:chExt cx="0" cy="0"/>
+        </a:xfrm>
+      </p:grpSpPr>
+      <p:sp>
+        <p:nvSpPr>
+          <p:cNvPr id="2" name="Title 1">
+            <a:extLst>
+              <a:ext uri="{FF2B5EF4-FFF2-40B4-BE49-F238E27FC236}">
+                <a16:creationId xmlns:a16="http://schemas.microsoft.com/office/drawing/2014/main" id="{3D85D895-6965-C7F4-B252-59A18BE1297D}"/>
+              </a:ext>
+            </a:extLst>
+          </p:cNvPr>
+          <p:cNvSpPr>
+            <a:spLocks noGrp="1"/>
+          </p:cNvSpPr>
+          <p:nvPr>
+            <p:ph type="title"/>
+          </p:nvPr>
+        </p:nvSpPr>
+        <p:spPr>
+          <a:xfrm>
+            <a:off x="1295400" y="172159"/>
+            <a:ext cx="9601200" cy="562947"/>
+          </a:xfrm>
+        </p:spPr>
+        <p:txBody>
+          <a:bodyPr/>
+          <a:lstStyle/>
+          <a:p>
+            <a:r>
+              <a:rPr lang="en-US" dirty="0"/>
+              <a:t>Sort Algorithms – Quick </a:t>
+            </a:r>
+          </a:p>
+        </p:txBody>
+      </p:sp>
+      <p:sp>
+        <p:nvSpPr>
+          <p:cNvPr id="4" name="TextBox 3">
+            <a:extLst>
+              <a:ext uri="{FF2B5EF4-FFF2-40B4-BE49-F238E27FC236}">
+                <a16:creationId xmlns:a16="http://schemas.microsoft.com/office/drawing/2014/main" id="{CDA65E49-1966-59FE-9D45-1A4FFE72205B}"/>
+              </a:ext>
+            </a:extLst>
+          </p:cNvPr>
+          <p:cNvSpPr txBox="1"/>
+          <p:nvPr/>
+        </p:nvSpPr>
+        <p:spPr>
+          <a:xfrm>
+            <a:off x="259978" y="951361"/>
+            <a:ext cx="11331388" cy="3370153"/>
+          </a:xfrm>
+          <a:prstGeom prst="rect">
+            <a:avLst/>
+          </a:prstGeom>
+          <a:noFill/>
+        </p:spPr>
+        <p:txBody>
+          <a:bodyPr wrap="square">
+            <a:spAutoFit/>
+          </a:bodyPr>
+          <a:lstStyle/>
+          <a:p>
+            <a:pPr algn="l" rtl="0" fontAlgn="base">
+              <a:spcAft>
+                <a:spcPts val="750"/>
+              </a:spcAft>
+              <a:buNone/>
+            </a:pPr>
+            <a:r>
+              <a:rPr lang="en-US" sz="1600" b="1" i="0" dirty="0" err="1">
+                <a:solidFill>
+                  <a:srgbClr val="273239"/>
+                </a:solidFill>
+                <a:effectLst/>
+                <a:latin typeface="Nunito" pitchFamily="2" charset="0"/>
+              </a:rPr>
+              <a:t>QuickSort</a:t>
+            </a:r>
+            <a:r>
+              <a:rPr lang="en-US" sz="1600" b="0" i="0" dirty="0">
+                <a:solidFill>
+                  <a:srgbClr val="273239"/>
+                </a:solidFill>
+                <a:effectLst/>
+                <a:latin typeface="Nunito" pitchFamily="2" charset="0"/>
+              </a:rPr>
+              <a:t> is a sorting algorithm based on the Divide and Conquer that picks an element as a pivot and partitions the given array around the picked pivot by placing the pivot in its correct position in the sorted array.</a:t>
+            </a:r>
+          </a:p>
+          <a:p>
+            <a:pPr algn="l" rtl="0" fontAlgn="base">
+              <a:spcAft>
+                <a:spcPts val="750"/>
+              </a:spcAft>
+              <a:buNone/>
+            </a:pPr>
+            <a:r>
+              <a:rPr lang="en-US" sz="1600" b="0" i="0" dirty="0">
+                <a:solidFill>
+                  <a:srgbClr val="273239"/>
+                </a:solidFill>
+                <a:effectLst/>
+                <a:latin typeface="Nunito" pitchFamily="2" charset="0"/>
+              </a:rPr>
+              <a:t>It works on the principle of </a:t>
+            </a:r>
+            <a:r>
+              <a:rPr lang="en-US" sz="1600" b="1" i="0" dirty="0">
+                <a:solidFill>
+                  <a:srgbClr val="273239"/>
+                </a:solidFill>
+                <a:effectLst/>
+                <a:latin typeface="Nunito" pitchFamily="2" charset="0"/>
+              </a:rPr>
+              <a:t>divide and conquer</a:t>
+            </a:r>
+            <a:r>
+              <a:rPr lang="en-US" sz="1600" b="0" i="0" dirty="0">
+                <a:solidFill>
+                  <a:srgbClr val="273239"/>
+                </a:solidFill>
+                <a:effectLst/>
+                <a:latin typeface="Nunito" pitchFamily="2" charset="0"/>
+              </a:rPr>
+              <a:t>, breaking down the problem into smaller sub-problems.</a:t>
+            </a:r>
+          </a:p>
+          <a:p>
+            <a:pPr algn="l" rtl="0" fontAlgn="base">
+              <a:spcAft>
+                <a:spcPts val="750"/>
+              </a:spcAft>
+              <a:buNone/>
+            </a:pPr>
+            <a:r>
+              <a:rPr lang="en-US" sz="1600" b="0" i="0" dirty="0">
+                <a:solidFill>
+                  <a:srgbClr val="273239"/>
+                </a:solidFill>
+                <a:effectLst/>
+                <a:latin typeface="Nunito" pitchFamily="2" charset="0"/>
+              </a:rPr>
+              <a:t>There are mainly three steps in the algorithm:</a:t>
+            </a:r>
+          </a:p>
+          <a:p>
+            <a:pPr algn="l" fontAlgn="base">
+              <a:spcAft>
+                <a:spcPts val="1800"/>
+              </a:spcAft>
+              <a:buFont typeface="+mj-lt"/>
+              <a:buAutoNum type="arabicPeriod"/>
+            </a:pPr>
+            <a:r>
+              <a:rPr lang="en-US" sz="1400" b="1" i="0" dirty="0">
+                <a:solidFill>
+                  <a:srgbClr val="273239"/>
+                </a:solidFill>
+                <a:effectLst/>
+                <a:latin typeface="Nunito" pitchFamily="2" charset="0"/>
+              </a:rPr>
+              <a:t>Choose a Pivot: </a:t>
+            </a:r>
+            <a:r>
+              <a:rPr lang="en-US" sz="1400" b="0" i="0" dirty="0">
+                <a:solidFill>
+                  <a:srgbClr val="273239"/>
+                </a:solidFill>
+                <a:effectLst/>
+                <a:latin typeface="Nunito" pitchFamily="2" charset="0"/>
+              </a:rPr>
+              <a:t>Select an element from the array as the pivot. The choice of pivot can vary (e.g., first element, last element, random element, or median).</a:t>
+            </a:r>
+          </a:p>
+          <a:p>
+            <a:pPr algn="l" fontAlgn="base">
+              <a:spcAft>
+                <a:spcPts val="1800"/>
+              </a:spcAft>
+              <a:buFont typeface="+mj-lt"/>
+              <a:buAutoNum type="arabicPeriod" startAt="2"/>
+            </a:pPr>
+            <a:r>
+              <a:rPr lang="en-US" sz="1400" b="1" i="0" dirty="0">
+                <a:solidFill>
+                  <a:srgbClr val="273239"/>
+                </a:solidFill>
+                <a:effectLst/>
+                <a:latin typeface="Nunito" pitchFamily="2" charset="0"/>
+              </a:rPr>
+              <a:t>Partition the Array:</a:t>
+            </a:r>
+            <a:r>
+              <a:rPr lang="en-US" sz="1400" b="0" i="0" dirty="0">
+                <a:solidFill>
+                  <a:srgbClr val="273239"/>
+                </a:solidFill>
+                <a:effectLst/>
+                <a:latin typeface="Nunito" pitchFamily="2" charset="0"/>
+              </a:rPr>
+              <a:t> Rearrange the array around the pivot. After partitioning, all elements smaller than the pivot will be on its left, and all elements greater than the pivot will be on its right. The pivot is then in its correct position, and we obtain the index of the pivot.</a:t>
+            </a:r>
+          </a:p>
+          <a:p>
+            <a:pPr algn="l" fontAlgn="base">
+              <a:spcAft>
+                <a:spcPts val="1800"/>
+              </a:spcAft>
+              <a:buFont typeface="+mj-lt"/>
+              <a:buAutoNum type="arabicPeriod" startAt="3"/>
+            </a:pPr>
+            <a:r>
+              <a:rPr lang="en-US" sz="1400" b="1" i="0" dirty="0">
+                <a:solidFill>
+                  <a:srgbClr val="273239"/>
+                </a:solidFill>
+                <a:effectLst/>
+                <a:latin typeface="Nunito" pitchFamily="2" charset="0"/>
+              </a:rPr>
+              <a:t>Recursively Call:</a:t>
+            </a:r>
+            <a:r>
+              <a:rPr lang="en-US" sz="1400" b="0" i="0" dirty="0">
+                <a:solidFill>
+                  <a:srgbClr val="273239"/>
+                </a:solidFill>
+                <a:effectLst/>
+                <a:latin typeface="Nunito" pitchFamily="2" charset="0"/>
+              </a:rPr>
+              <a:t> Recursively apply the same process to the two partitioned sub-arrays (left and right of the pivot).</a:t>
+            </a:r>
+          </a:p>
+          <a:p>
+            <a:pPr algn="l" fontAlgn="base">
+              <a:spcAft>
+                <a:spcPts val="1800"/>
+              </a:spcAft>
+              <a:buFont typeface="+mj-lt"/>
+              <a:buAutoNum type="arabicPeriod" startAt="4"/>
+            </a:pPr>
+            <a:r>
+              <a:rPr lang="en-US" sz="1400" b="1" i="0" dirty="0">
+                <a:solidFill>
+                  <a:srgbClr val="273239"/>
+                </a:solidFill>
+                <a:effectLst/>
+                <a:latin typeface="Nunito" pitchFamily="2" charset="0"/>
+              </a:rPr>
+              <a:t>Base Case:</a:t>
+            </a:r>
+            <a:r>
+              <a:rPr lang="en-US" sz="1400" b="0" i="0" dirty="0">
+                <a:solidFill>
+                  <a:srgbClr val="273239"/>
+                </a:solidFill>
+                <a:effectLst/>
+                <a:latin typeface="Nunito" pitchFamily="2" charset="0"/>
+              </a:rPr>
+              <a:t> The recursion stops when there is only one element left in the sub-array, as a single element is already sorted.</a:t>
+            </a:r>
+          </a:p>
+        </p:txBody>
+      </p:sp>
+      <p:pic>
+        <p:nvPicPr>
+          <p:cNvPr id="8" name="Picture 7">
+            <a:extLst>
+              <a:ext uri="{FF2B5EF4-FFF2-40B4-BE49-F238E27FC236}">
+                <a16:creationId xmlns:a16="http://schemas.microsoft.com/office/drawing/2014/main" id="{50D36D6D-AA71-78B3-3B51-7BAD34E3C8CC}"/>
+              </a:ext>
+            </a:extLst>
+          </p:cNvPr>
+          <p:cNvPicPr>
+            <a:picLocks noChangeAspect="1"/>
+          </p:cNvPicPr>
+          <p:nvPr/>
+        </p:nvPicPr>
+        <p:blipFill>
+          <a:blip r:embed="rId2"/>
+          <a:stretch>
+            <a:fillRect/>
+          </a:stretch>
+        </p:blipFill>
+        <p:spPr>
+          <a:xfrm>
+            <a:off x="3290048" y="4321514"/>
+            <a:ext cx="4931824" cy="2511500"/>
+          </a:xfrm>
+          <a:prstGeom prst="rect">
+            <a:avLst/>
+          </a:prstGeom>
+        </p:spPr>
+      </p:pic>
+    </p:spTree>
+    <p:extLst>
+      <p:ext uri="{BB962C8B-B14F-4D97-AF65-F5344CB8AC3E}">
+        <p14:creationId xmlns:p14="http://schemas.microsoft.com/office/powerpoint/2010/main" val="2583998308"/>
+      </p:ext>
+    </p:extLst>
+  </p:cSld>
+  <p:clrMapOvr>
+    <a:masterClrMapping/>
+  </p:clrMapOvr>
+  <mc:AlternateContent xmlns:mc="http://schemas.openxmlformats.org/markup-compatibility/2006" xmlns:p14="http://schemas.microsoft.com/office/powerpoint/2010/main">
+    <mc:Choice Requires="p14">
+      <p:transition spd="med" p14:dur="700">
+        <p:fade/>
+      </p:transition>
+    </mc:Choice>
+    <mc:Fallback xmlns="">
+      <p:transition spd="med">
+        <p:fade/>
+      </p:transition>
+    </mc:Fallback>
+  </mc:AlternateContent>
+</p:sld>
+</file>
+
+<file path=ppt/slides/slide14.xml><?xml version="1.0" encoding="utf-8"?>
+<p:sld xmlns:a="http://schemas.openxmlformats.org/drawingml/2006/main" xmlns:r="http://schemas.openxmlformats.org/officeDocument/2006/relationships" xmlns:p="http://schemas.openxmlformats.org/presentationml/2006/main">
+  <p:cSld>
+    <p:spTree>
+      <p:nvGrpSpPr>
+        <p:cNvPr id="1" name="">
+          <a:extLst>
+            <a:ext uri="{FF2B5EF4-FFF2-40B4-BE49-F238E27FC236}">
+              <a16:creationId xmlns:a16="http://schemas.microsoft.com/office/drawing/2014/main" id="{310DF9AB-0BDC-9E10-5BBD-23D56FC487BE}"/>
+            </a:ext>
+          </a:extLst>
+        </p:cNvPr>
+        <p:cNvGrpSpPr/>
+        <p:nvPr/>
+      </p:nvGrpSpPr>
+      <p:grpSpPr>
+        <a:xfrm>
+          <a:off x="0" y="0"/>
+          <a:ext cx="0" cy="0"/>
+          <a:chOff x="0" y="0"/>
+          <a:chExt cx="0" cy="0"/>
+        </a:xfrm>
+      </p:grpSpPr>
+      <p:sp>
+        <p:nvSpPr>
+          <p:cNvPr id="2" name="Title 1">
+            <a:extLst>
+              <a:ext uri="{FF2B5EF4-FFF2-40B4-BE49-F238E27FC236}">
+                <a16:creationId xmlns:a16="http://schemas.microsoft.com/office/drawing/2014/main" id="{B64CD9C6-7F33-39B6-87BA-FFF6CF4AE72E}"/>
+              </a:ext>
+            </a:extLst>
+          </p:cNvPr>
+          <p:cNvSpPr>
+            <a:spLocks noGrp="1"/>
+          </p:cNvSpPr>
+          <p:nvPr>
+            <p:ph type="title"/>
+          </p:nvPr>
+        </p:nvSpPr>
+        <p:spPr>
+          <a:xfrm>
+            <a:off x="1295400" y="107576"/>
+            <a:ext cx="9601200" cy="562947"/>
+          </a:xfrm>
+        </p:spPr>
+        <p:txBody>
+          <a:bodyPr/>
+          <a:lstStyle/>
+          <a:p>
+            <a:r>
+              <a:rPr lang="en-US" dirty="0"/>
+              <a:t>Sort Algorithms – Quick – Explanation </a:t>
+            </a:r>
+          </a:p>
+        </p:txBody>
+      </p:sp>
+      <p:pic>
+        <p:nvPicPr>
+          <p:cNvPr id="5" name="Picture 4">
+            <a:extLst>
+              <a:ext uri="{FF2B5EF4-FFF2-40B4-BE49-F238E27FC236}">
+                <a16:creationId xmlns:a16="http://schemas.microsoft.com/office/drawing/2014/main" id="{60FCA8D7-2C4F-C704-C78A-D433EAC57F07}"/>
+              </a:ext>
+            </a:extLst>
+          </p:cNvPr>
+          <p:cNvPicPr>
+            <a:picLocks noChangeAspect="1"/>
+          </p:cNvPicPr>
+          <p:nvPr/>
+        </p:nvPicPr>
+        <p:blipFill>
+          <a:blip r:embed="rId2"/>
+          <a:stretch>
+            <a:fillRect/>
+          </a:stretch>
+        </p:blipFill>
+        <p:spPr>
+          <a:xfrm>
+            <a:off x="222128" y="1158115"/>
+            <a:ext cx="3810616" cy="1898849"/>
+          </a:xfrm>
+          <a:prstGeom prst="rect">
+            <a:avLst/>
+          </a:prstGeom>
+        </p:spPr>
+      </p:pic>
+      <p:pic>
+        <p:nvPicPr>
+          <p:cNvPr id="7" name="Picture 6">
+            <a:extLst>
+              <a:ext uri="{FF2B5EF4-FFF2-40B4-BE49-F238E27FC236}">
+                <a16:creationId xmlns:a16="http://schemas.microsoft.com/office/drawing/2014/main" id="{50F35663-613D-708F-3760-B256373D4EA1}"/>
+              </a:ext>
+            </a:extLst>
+          </p:cNvPr>
+          <p:cNvPicPr>
+            <a:picLocks noChangeAspect="1"/>
+          </p:cNvPicPr>
+          <p:nvPr/>
+        </p:nvPicPr>
+        <p:blipFill>
+          <a:blip r:embed="rId3"/>
+          <a:stretch>
+            <a:fillRect/>
+          </a:stretch>
+        </p:blipFill>
+        <p:spPr>
+          <a:xfrm>
+            <a:off x="4131049" y="1158115"/>
+            <a:ext cx="3929901" cy="1908943"/>
+          </a:xfrm>
+          <a:prstGeom prst="rect">
+            <a:avLst/>
+          </a:prstGeom>
+        </p:spPr>
+      </p:pic>
+      <p:pic>
+        <p:nvPicPr>
+          <p:cNvPr id="10" name="Picture 9">
+            <a:extLst>
+              <a:ext uri="{FF2B5EF4-FFF2-40B4-BE49-F238E27FC236}">
+                <a16:creationId xmlns:a16="http://schemas.microsoft.com/office/drawing/2014/main" id="{B75F9611-14F9-F366-858F-0C96E1B92A5B}"/>
+              </a:ext>
+            </a:extLst>
+          </p:cNvPr>
+          <p:cNvPicPr>
+            <a:picLocks noChangeAspect="1"/>
+          </p:cNvPicPr>
+          <p:nvPr/>
+        </p:nvPicPr>
+        <p:blipFill>
+          <a:blip r:embed="rId4"/>
+          <a:stretch>
+            <a:fillRect/>
+          </a:stretch>
+        </p:blipFill>
+        <p:spPr>
+          <a:xfrm>
+            <a:off x="8248917" y="1158115"/>
+            <a:ext cx="3959912" cy="1898849"/>
+          </a:xfrm>
+          <a:prstGeom prst="rect">
+            <a:avLst/>
+          </a:prstGeom>
+        </p:spPr>
+      </p:pic>
+      <p:pic>
+        <p:nvPicPr>
+          <p:cNvPr id="12" name="Picture 11">
+            <a:extLst>
+              <a:ext uri="{FF2B5EF4-FFF2-40B4-BE49-F238E27FC236}">
+                <a16:creationId xmlns:a16="http://schemas.microsoft.com/office/drawing/2014/main" id="{6666000E-7C82-1961-0B12-0178368218F1}"/>
+              </a:ext>
+            </a:extLst>
+          </p:cNvPr>
+          <p:cNvPicPr>
+            <a:picLocks noChangeAspect="1"/>
+          </p:cNvPicPr>
+          <p:nvPr/>
+        </p:nvPicPr>
+        <p:blipFill>
+          <a:blip r:embed="rId5"/>
+          <a:stretch>
+            <a:fillRect/>
+          </a:stretch>
+        </p:blipFill>
+        <p:spPr>
+          <a:xfrm>
+            <a:off x="222128" y="3801036"/>
+            <a:ext cx="3810616" cy="1820475"/>
+          </a:xfrm>
+          <a:prstGeom prst="rect">
+            <a:avLst/>
+          </a:prstGeom>
+        </p:spPr>
+      </p:pic>
+      <p:pic>
+        <p:nvPicPr>
+          <p:cNvPr id="14" name="Picture 13">
+            <a:extLst>
+              <a:ext uri="{FF2B5EF4-FFF2-40B4-BE49-F238E27FC236}">
+                <a16:creationId xmlns:a16="http://schemas.microsoft.com/office/drawing/2014/main" id="{EC73BBB2-BCD5-980D-1A55-496BD9582A6D}"/>
+              </a:ext>
+            </a:extLst>
+          </p:cNvPr>
+          <p:cNvPicPr>
+            <a:picLocks noChangeAspect="1"/>
+          </p:cNvPicPr>
+          <p:nvPr/>
+        </p:nvPicPr>
+        <p:blipFill>
+          <a:blip r:embed="rId6"/>
+          <a:stretch>
+            <a:fillRect/>
+          </a:stretch>
+        </p:blipFill>
+        <p:spPr>
+          <a:xfrm>
+            <a:off x="4131049" y="3801037"/>
+            <a:ext cx="3929901" cy="1840772"/>
+          </a:xfrm>
+          <a:prstGeom prst="rect">
+            <a:avLst/>
+          </a:prstGeom>
+        </p:spPr>
+      </p:pic>
+      <p:pic>
+        <p:nvPicPr>
+          <p:cNvPr id="16" name="Picture 15">
+            <a:extLst>
+              <a:ext uri="{FF2B5EF4-FFF2-40B4-BE49-F238E27FC236}">
+                <a16:creationId xmlns:a16="http://schemas.microsoft.com/office/drawing/2014/main" id="{2B26AB64-3811-AE05-69EC-3301EC6013CB}"/>
+              </a:ext>
+            </a:extLst>
+          </p:cNvPr>
+          <p:cNvPicPr>
+            <a:picLocks noChangeAspect="1"/>
+          </p:cNvPicPr>
+          <p:nvPr/>
+        </p:nvPicPr>
+        <p:blipFill>
+          <a:blip r:embed="rId7"/>
+          <a:stretch>
+            <a:fillRect/>
+          </a:stretch>
+        </p:blipFill>
+        <p:spPr>
+          <a:xfrm>
+            <a:off x="8248917" y="3790942"/>
+            <a:ext cx="3910648" cy="1908943"/>
+          </a:xfrm>
+          <a:prstGeom prst="rect">
+            <a:avLst/>
+          </a:prstGeom>
+        </p:spPr>
+      </p:pic>
+    </p:spTree>
+    <p:extLst>
+      <p:ext uri="{BB962C8B-B14F-4D97-AF65-F5344CB8AC3E}">
+        <p14:creationId xmlns:p14="http://schemas.microsoft.com/office/powerpoint/2010/main" val="3121845221"/>
       </p:ext>
     </p:extLst>
   </p:cSld>

</xml_diff>